<commit_message>
apresentação pronta eu acho
</commit_message>
<xml_diff>
--- a/presentation/presentation.pptx
+++ b/presentation/presentation.pptx
@@ -4694,7 +4694,7 @@
             <a:pPr lvl="1"/>
             <a:r>
               <a:rPr lang="pt-BR" sz="2400" dirty="0"/>
-              <a:t>Isto acontece devido a quantidade de casos nos quais a evolução é “Recuperado” ser muito maior que a de óbitos.</a:t>
+              <a:t>Isto acontece devido a quantidade de casos nos quais a evolução é “Recuperado” ser muito maior que a de óbitos (&gt;98.5% de recuperados).</a:t>
             </a:r>
           </a:p>
           <a:p>
@@ -6037,18 +6037,14 @@
             <a:pPr lvl="1"/>
             <a:r>
               <a:rPr lang="pt-BR" sz="2400" dirty="0"/>
-              <a:t>Os resultados obtidos com os métodos de mineração de dados mostraram que alguns sintomas prevalecem em comparação a outros quando se trata de pacientes que foram a óbito.</a:t>
+              <a:t>Os resultados obtidos com os métodos de mineração de dados mostraram padrões nos dados que não são triviais, como por exemplo que alguns sintomas prevalecem em comparação a outros quando se trata de pacientes que foram a óbito.</a:t>
             </a:r>
           </a:p>
           <a:p>
             <a:pPr lvl="1"/>
             <a:r>
               <a:rPr lang="pt-BR" sz="2400" dirty="0"/>
-              <a:t>Isto pode ser útil </a:t>
-            </a:r>
-            <a:r>
-              <a:rPr lang="pt-BR" sz="2400"/>
-              <a:t>em casos </a:t>
+              <a:t>Essas descobertas podem ser valiosas, por exemplo, em situações clínicas, auxiliando na identificação precoce e manejo de pacientes com suspeita de COVID-19.</a:t>
             </a:r>
           </a:p>
           <a:p>
@@ -6149,18 +6145,21 @@
             <a:pPr lvl="1"/>
             <a:r>
               <a:rPr lang="pt-BR" sz="2400" dirty="0"/>
-              <a:t>Em trabalhos futuros buscamos explorar ainda mais os dados da doença no estado.</a:t>
+              <a:t>Em trabalhos futuros buscamos explorar ainda mais os dados da doença no estado. </a:t>
             </a:r>
           </a:p>
           <a:p>
             <a:pPr lvl="1"/>
             <a:r>
-              <a:rPr lang="pt-BR" sz="2400" dirty="0">
-                <a:solidFill>
-                  <a:srgbClr val="FF0000"/>
-                </a:solidFill>
-              </a:rPr>
-              <a:t>[...]</a:t>
+              <a:rPr lang="pt-BR" sz="2400" dirty="0"/>
+              <a:t>Investigar a evolução dos padrões de sintomas ao longo do tempo.</a:t>
+            </a:r>
+          </a:p>
+          <a:p>
+            <a:pPr lvl="1"/>
+            <a:r>
+              <a:rPr lang="pt-BR" sz="2400" dirty="0"/>
+              <a:t>Combinar conjuntos de dados da COVID-19 com informações como ocupação de leitos hospitalares e dados de vacinação</a:t>
             </a:r>
           </a:p>
         </p:txBody>
@@ -6388,7 +6387,7 @@
             </a:r>
             <a:r>
               <a:rPr lang="pt-BR" sz="2400" dirty="0"/>
-              <a:t> utilizado conta com mais de 3 milhões de linhas e pesa mais de 600MB</a:t>
+              <a:t> utilizado conta com aproximadamente 3 milhões de linhas e pesa mais de 600MB</a:t>
             </a:r>
           </a:p>
         </p:txBody>

</xml_diff>